<commit_message>
updated all files and directory
</commit_message>
<xml_diff>
--- a/Reinforcement Learning2.pptx
+++ b/Reinforcement Learning2.pptx
@@ -20,6 +20,7 @@
     <p:sldId id="265" r:id="rId15"/>
     <p:sldId id="266" r:id="rId16"/>
     <p:sldId id="267" r:id="rId17"/>
+    <p:sldId id="268" r:id="rId18"/>
   </p:sldIdLst>
   <p:sldSz cy="5143500" cx="9144000"/>
   <p:notesSz cx="6858000" cy="9144000"/>
@@ -268,7 +269,7 @@
       </p15:sldGuideLst>
     </p:ext>
     <p:ext uri="GoogleSlidesCustomDataVersion2">
-      <go:slidesCustomData xmlns:go="http://customooxmlschemas.google.com/" r:id="rId18" roundtripDataSignature="AMtx7mjrWd2gUudMgkoTvu1viXKxmlT/rQ=="/>
+      <go:slidesCustomData xmlns:go="http://customooxmlschemas.google.com/" r:id="rId19" roundtripDataSignature="AMtx7mhXp8m3ivNbEb5+rF2XiKFEM9XXKw=="/>
     </p:ext>
   </p:extLst>
 </p:presentation>
@@ -946,7 +947,7 @@
   <p:cSld>
     <p:spTree>
       <p:nvGrpSpPr>
-        <p:cNvPr id="130" name="Shape 130"/>
+        <p:cNvPr id="132" name="Shape 132"/>
         <p:cNvGrpSpPr/>
         <p:nvPr/>
       </p:nvGrpSpPr>
@@ -960,7 +961,7 @@
       </p:grpSpPr>
       <p:sp>
         <p:nvSpPr>
-          <p:cNvPr id="131" name="Google Shape;131;g25557fec8d8_0_0:notes"/>
+          <p:cNvPr id="133" name="Google Shape;133;g25557fec8d8_0_0:notes"/>
           <p:cNvSpPr/>
           <p:nvPr>
             <p:ph idx="2" type="sldImg"/>
@@ -995,7 +996,7 @@
       </p:sp>
       <p:sp>
         <p:nvSpPr>
-          <p:cNvPr id="132" name="Google Shape;132;g25557fec8d8_0_0:notes"/>
+          <p:cNvPr id="134" name="Google Shape;134;g25557fec8d8_0_0:notes"/>
           <p:cNvSpPr txBox="1"/>
           <p:nvPr>
             <p:ph idx="1" type="body"/>
@@ -1045,7 +1046,7 @@
   <p:cSld>
     <p:spTree>
       <p:nvGrpSpPr>
-        <p:cNvPr id="136" name="Shape 136"/>
+        <p:cNvPr id="138" name="Shape 138"/>
         <p:cNvGrpSpPr/>
         <p:nvPr/>
       </p:nvGrpSpPr>
@@ -1059,7 +1060,106 @@
       </p:grpSpPr>
       <p:sp>
         <p:nvSpPr>
-          <p:cNvPr id="137" name="Google Shape;137;p8:notes"/>
+          <p:cNvPr id="139" name="Google Shape;139;g2595407c48b_0_5:notes"/>
+          <p:cNvSpPr/>
+          <p:nvPr>
+            <p:ph idx="2" type="sldImg"/>
+          </p:nvPr>
+        </p:nvSpPr>
+        <p:spPr>
+          <a:xfrm>
+            <a:off x="381300" y="685800"/>
+            <a:ext cx="6096000" cy="3429000"/>
+          </a:xfrm>
+          <a:custGeom>
+            <a:rect b="b" l="l" r="r" t="t"/>
+            <a:pathLst>
+              <a:path extrusionOk="0" h="120000" w="120000">
+                <a:moveTo>
+                  <a:pt x="0" y="0"/>
+                </a:moveTo>
+                <a:lnTo>
+                  <a:pt x="120000" y="0"/>
+                </a:lnTo>
+                <a:lnTo>
+                  <a:pt x="120000" y="120000"/>
+                </a:lnTo>
+                <a:lnTo>
+                  <a:pt x="0" y="120000"/>
+                </a:lnTo>
+                <a:close/>
+              </a:path>
+            </a:pathLst>
+          </a:custGeom>
+        </p:spPr>
+      </p:sp>
+      <p:sp>
+        <p:nvSpPr>
+          <p:cNvPr id="140" name="Google Shape;140;g2595407c48b_0_5:notes"/>
+          <p:cNvSpPr txBox="1"/>
+          <p:nvPr>
+            <p:ph idx="1" type="body"/>
+          </p:nvPr>
+        </p:nvSpPr>
+        <p:spPr>
+          <a:xfrm>
+            <a:off x="685800" y="4343400"/>
+            <a:ext cx="5486400" cy="4114800"/>
+          </a:xfrm>
+          <a:prstGeom prst="rect">
+            <a:avLst/>
+          </a:prstGeom>
+        </p:spPr>
+        <p:txBody>
+          <a:bodyPr anchorCtr="0" anchor="t" bIns="91425" lIns="91425" spcFirstLastPara="1" rIns="91425" wrap="square" tIns="91425">
+            <a:noAutofit/>
+          </a:bodyPr>
+          <a:lstStyle/>
+          <a:p>
+            <a:pPr indent="0" lvl="0" marL="0" rtl="0" algn="l">
+              <a:spcBef>
+                <a:spcPts val="0"/>
+              </a:spcBef>
+              <a:spcAft>
+                <a:spcPts val="0"/>
+              </a:spcAft>
+              <a:buNone/>
+            </a:pPr>
+            <a:r>
+              <a:t/>
+            </a:r>
+            <a:endParaRPr/>
+          </a:p>
+        </p:txBody>
+      </p:sp>
+    </p:spTree>
+  </p:cSld>
+  <p:clrMapOvr>
+    <a:masterClrMapping/>
+  </p:clrMapOvr>
+</p:notes>
+</file>
+
+<file path=ppt/notesSlides/notesSlide12.xml><?xml version="1.0" encoding="utf-8"?>
+<p:notes xmlns:a="http://schemas.openxmlformats.org/drawingml/2006/main" xmlns:r="http://schemas.openxmlformats.org/officeDocument/2006/relationships" xmlns:mc="http://schemas.openxmlformats.org/markup-compatibility/2006" xmlns:mv="urn:schemas-microsoft-com:mac:vml" xmlns:p="http://schemas.openxmlformats.org/presentationml/2006/main" xmlns:c="http://schemas.openxmlformats.org/drawingml/2006/chart" xmlns:dgm="http://schemas.openxmlformats.org/drawingml/2006/diagram" xmlns:o="urn:schemas-microsoft-com:office:office" xmlns:v="urn:schemas-microsoft-com:vml" xmlns:pvml="urn:schemas-microsoft-com:office:powerpoint" xmlns:com="http://schemas.openxmlformats.org/drawingml/2006/compatibility" xmlns:p14="http://schemas.microsoft.com/office/powerpoint/2010/main" xmlns:p15="http://schemas.microsoft.com/office/powerpoint/2012/main" xmlns:ahyp="http://schemas.microsoft.com/office/drawing/2018/hyperlinkcolor" showMasterPhAnim="0" showMasterSp="0">
+  <p:cSld>
+    <p:spTree>
+      <p:nvGrpSpPr>
+        <p:cNvPr id="144" name="Shape 144"/>
+        <p:cNvGrpSpPr/>
+        <p:nvPr/>
+      </p:nvGrpSpPr>
+      <p:grpSpPr>
+        <a:xfrm>
+          <a:off x="0" y="0"/>
+          <a:ext cx="0" cy="0"/>
+          <a:chOff x="0" y="0"/>
+          <a:chExt cx="0" cy="0"/>
+        </a:xfrm>
+      </p:grpSpPr>
+      <p:sp>
+        <p:nvSpPr>
+          <p:cNvPr id="145" name="Google Shape;145;p8:notes"/>
           <p:cNvSpPr/>
           <p:nvPr>
             <p:ph idx="2" type="sldImg"/>
@@ -1104,7 +1204,7 @@
       </p:sp>
       <p:sp>
         <p:nvSpPr>
-          <p:cNvPr id="138" name="Google Shape;138;p8:notes"/>
+          <p:cNvPr id="146" name="Google Shape;146;p8:notes"/>
           <p:cNvSpPr txBox="1"/>
           <p:nvPr>
             <p:ph idx="1" type="body"/>
@@ -1157,12 +1257,12 @@
 </p:notes>
 </file>
 
-<file path=ppt/notesSlides/notesSlide12.xml><?xml version="1.0" encoding="utf-8"?>
+<file path=ppt/notesSlides/notesSlide13.xml><?xml version="1.0" encoding="utf-8"?>
 <p:notes xmlns:a="http://schemas.openxmlformats.org/drawingml/2006/main" xmlns:r="http://schemas.openxmlformats.org/officeDocument/2006/relationships" xmlns:mc="http://schemas.openxmlformats.org/markup-compatibility/2006" xmlns:mv="urn:schemas-microsoft-com:mac:vml" xmlns:p="http://schemas.openxmlformats.org/presentationml/2006/main" xmlns:c="http://schemas.openxmlformats.org/drawingml/2006/chart" xmlns:dgm="http://schemas.openxmlformats.org/drawingml/2006/diagram" xmlns:o="urn:schemas-microsoft-com:office:office" xmlns:v="urn:schemas-microsoft-com:vml" xmlns:pvml="urn:schemas-microsoft-com:office:powerpoint" xmlns:com="http://schemas.openxmlformats.org/drawingml/2006/compatibility" xmlns:p14="http://schemas.microsoft.com/office/powerpoint/2010/main" xmlns:p15="http://schemas.microsoft.com/office/powerpoint/2012/main" xmlns:ahyp="http://schemas.microsoft.com/office/drawing/2018/hyperlinkcolor" showMasterPhAnim="0" showMasterSp="0">
   <p:cSld>
     <p:spTree>
       <p:nvGrpSpPr>
-        <p:cNvPr id="143" name="Shape 143"/>
+        <p:cNvPr id="151" name="Shape 151"/>
         <p:cNvGrpSpPr/>
         <p:nvPr/>
       </p:nvGrpSpPr>
@@ -1176,7 +1276,7 @@
       </p:grpSpPr>
       <p:sp>
         <p:nvSpPr>
-          <p:cNvPr id="144" name="Google Shape;144;p9:notes"/>
+          <p:cNvPr id="152" name="Google Shape;152;p9:notes"/>
           <p:cNvSpPr/>
           <p:nvPr>
             <p:ph idx="2" type="sldImg"/>
@@ -1221,7 +1321,7 @@
       </p:sp>
       <p:sp>
         <p:nvSpPr>
-          <p:cNvPr id="145" name="Google Shape;145;p9:notes"/>
+          <p:cNvPr id="153" name="Google Shape;153;p9:notes"/>
           <p:cNvSpPr txBox="1"/>
           <p:nvPr>
             <p:ph idx="1" type="body"/>
@@ -8020,7 +8120,7 @@
   <p:cSld>
     <p:spTree>
       <p:nvGrpSpPr>
-        <p:cNvPr id="133" name="Shape 133"/>
+        <p:cNvPr id="135" name="Shape 135"/>
         <p:cNvGrpSpPr/>
         <p:nvPr/>
       </p:nvGrpSpPr>
@@ -8034,7 +8134,7 @@
       </p:grpSpPr>
       <p:sp>
         <p:nvSpPr>
-          <p:cNvPr id="134" name="Google Shape;134;g25557fec8d8_0_0"/>
+          <p:cNvPr id="136" name="Google Shape;136;g25557fec8d8_0_0"/>
           <p:cNvSpPr txBox="1"/>
           <p:nvPr>
             <p:ph type="title"/>
@@ -8066,15 +8166,7 @@
             </a:pPr>
             <a:r>
               <a:rPr lang="en"/>
-              <a:t>Framing the </a:t>
-            </a:r>
-            <a:r>
-              <a:rPr lang="en"/>
-              <a:t>Challenge</a:t>
-            </a:r>
-            <a:r>
-              <a:rPr lang="en"/>
-              <a:t> for RL</a:t>
+              <a:t>Improving Your Results</a:t>
             </a:r>
             <a:endParaRPr/>
           </a:p>
@@ -8082,7 +8174,7 @@
       </p:sp>
       <p:sp>
         <p:nvSpPr>
-          <p:cNvPr id="135" name="Google Shape;135;g25557fec8d8_0_0"/>
+          <p:cNvPr id="137" name="Google Shape;137;g25557fec8d8_0_0"/>
           <p:cNvSpPr txBox="1"/>
           <p:nvPr>
             <p:ph idx="1" type="body"/>
@@ -8108,13 +8200,45 @@
                 <a:spcPts val="0"/>
               </a:spcBef>
               <a:spcAft>
+                <a:spcPts val="0"/>
+              </a:spcAft>
+              <a:buNone/>
+            </a:pPr>
+            <a:r>
+              <a:rPr lang="en"/>
+              <a:t>Train Longer</a:t>
+            </a:r>
+            <a:endParaRPr/>
+          </a:p>
+          <a:p>
+            <a:pPr indent="0" lvl="0" marL="0" rtl="0" algn="l">
+              <a:spcBef>
                 <a:spcPts val="1200"/>
+              </a:spcBef>
+              <a:spcAft>
+                <a:spcPts val="0"/>
               </a:spcAft>
               <a:buNone/>
             </a:pPr>
             <a:r>
               <a:rPr lang="en"/>
-              <a:t>Exercise - </a:t>
+              <a:t>Hyperparameter Tuning</a:t>
+            </a:r>
+            <a:endParaRPr/>
+          </a:p>
+          <a:p>
+            <a:pPr indent="0" lvl="0" marL="0" rtl="0" algn="l">
+              <a:spcBef>
+                <a:spcPts val="1200"/>
+              </a:spcBef>
+              <a:spcAft>
+                <a:spcPts val="1200"/>
+              </a:spcAft>
+              <a:buNone/>
+            </a:pPr>
+            <a:r>
+              <a:rPr lang="en"/>
+              <a:t>Different Algorithms</a:t>
             </a:r>
             <a:endParaRPr/>
           </a:p>
@@ -8133,7 +8257,7 @@
   <p:cSld>
     <p:spTree>
       <p:nvGrpSpPr>
-        <p:cNvPr id="139" name="Shape 139"/>
+        <p:cNvPr id="141" name="Shape 141"/>
         <p:cNvGrpSpPr/>
         <p:nvPr/>
       </p:nvGrpSpPr>
@@ -8147,7 +8271,211 @@
       </p:grpSpPr>
       <p:sp>
         <p:nvSpPr>
-          <p:cNvPr id="140" name="Google Shape;140;p8"/>
+          <p:cNvPr id="142" name="Google Shape;142;g2595407c48b_0_5"/>
+          <p:cNvSpPr txBox="1"/>
+          <p:nvPr>
+            <p:ph type="title"/>
+          </p:nvPr>
+        </p:nvSpPr>
+        <p:spPr>
+          <a:xfrm>
+            <a:off x="311700" y="445025"/>
+            <a:ext cx="8520600" cy="572700"/>
+          </a:xfrm>
+          <a:prstGeom prst="rect">
+            <a:avLst/>
+          </a:prstGeom>
+        </p:spPr>
+        <p:txBody>
+          <a:bodyPr anchorCtr="0" anchor="t" bIns="91425" lIns="91425" spcFirstLastPara="1" rIns="91425" wrap="square" tIns="91425">
+            <a:normAutofit fontScale="90000"/>
+          </a:bodyPr>
+          <a:lstStyle/>
+          <a:p>
+            <a:pPr indent="0" lvl="0" marL="0" rtl="0" algn="l">
+              <a:spcBef>
+                <a:spcPts val="0"/>
+              </a:spcBef>
+              <a:spcAft>
+                <a:spcPts val="0"/>
+              </a:spcAft>
+              <a:buNone/>
+            </a:pPr>
+            <a:r>
+              <a:rPr lang="en"/>
+              <a:t>Available Environments</a:t>
+            </a:r>
+            <a:endParaRPr/>
+          </a:p>
+        </p:txBody>
+      </p:sp>
+      <p:sp>
+        <p:nvSpPr>
+          <p:cNvPr id="143" name="Google Shape;143;g2595407c48b_0_5"/>
+          <p:cNvSpPr txBox="1"/>
+          <p:nvPr>
+            <p:ph idx="1" type="body"/>
+          </p:nvPr>
+        </p:nvSpPr>
+        <p:spPr>
+          <a:xfrm>
+            <a:off x="311700" y="1152475"/>
+            <a:ext cx="8520600" cy="3416400"/>
+          </a:xfrm>
+          <a:prstGeom prst="rect">
+            <a:avLst/>
+          </a:prstGeom>
+        </p:spPr>
+        <p:txBody>
+          <a:bodyPr anchorCtr="0" anchor="t" bIns="91425" lIns="91425" spcFirstLastPara="1" rIns="91425" wrap="square" tIns="91425">
+            <a:normAutofit lnSpcReduction="20000"/>
+          </a:bodyPr>
+          <a:lstStyle/>
+          <a:p>
+            <a:pPr indent="0" lvl="0" marL="0" rtl="0" algn="l">
+              <a:spcBef>
+                <a:spcPts val="0"/>
+              </a:spcBef>
+              <a:spcAft>
+                <a:spcPts val="0"/>
+              </a:spcAft>
+              <a:buNone/>
+            </a:pPr>
+            <a:r>
+              <a:rPr lang="en" u="sng">
+                <a:solidFill>
+                  <a:schemeClr val="hlink"/>
+                </a:solidFill>
+                <a:hlinkClick r:id="rId3"/>
+              </a:rPr>
+              <a:t>https://gymnasium.farama.org/environments/toy_text/cliff_walking/</a:t>
+            </a:r>
+            <a:endParaRPr/>
+          </a:p>
+          <a:p>
+            <a:pPr indent="0" lvl="0" marL="0" rtl="0" algn="l">
+              <a:spcBef>
+                <a:spcPts val="1200"/>
+              </a:spcBef>
+              <a:spcAft>
+                <a:spcPts val="0"/>
+              </a:spcAft>
+              <a:buNone/>
+            </a:pPr>
+            <a:r>
+              <a:t/>
+            </a:r>
+            <a:endParaRPr/>
+          </a:p>
+          <a:p>
+            <a:pPr indent="0" lvl="0" marL="0" rtl="0" algn="l">
+              <a:spcBef>
+                <a:spcPts val="1200"/>
+              </a:spcBef>
+              <a:spcAft>
+                <a:spcPts val="0"/>
+              </a:spcAft>
+              <a:buNone/>
+            </a:pPr>
+            <a:r>
+              <a:rPr lang="en" u="sng">
+                <a:solidFill>
+                  <a:schemeClr val="hlink"/>
+                </a:solidFill>
+                <a:hlinkClick r:id="rId4"/>
+              </a:rPr>
+              <a:t>https://medium.com/@mlblogging.k/15-awesome-reinforcement-learning-environments-you-must-know-a38fb75867f2</a:t>
+            </a:r>
+            <a:endParaRPr/>
+          </a:p>
+          <a:p>
+            <a:pPr indent="0" lvl="0" marL="0" rtl="0" algn="l">
+              <a:spcBef>
+                <a:spcPts val="1200"/>
+              </a:spcBef>
+              <a:spcAft>
+                <a:spcPts val="0"/>
+              </a:spcAft>
+              <a:buNone/>
+            </a:pPr>
+            <a:r>
+              <a:rPr lang="en" u="sng">
+                <a:solidFill>
+                  <a:schemeClr val="hlink"/>
+                </a:solidFill>
+                <a:hlinkClick r:id="rId5"/>
+              </a:rPr>
+              <a:t>https://medium.com/@mlblogging.k/15-awesome-reinforcement-learning-environments-you-must-know-a38fb75867f2</a:t>
+            </a:r>
+            <a:endParaRPr/>
+          </a:p>
+          <a:p>
+            <a:pPr indent="0" lvl="0" marL="0" rtl="0" algn="l">
+              <a:spcBef>
+                <a:spcPts val="1200"/>
+              </a:spcBef>
+              <a:spcAft>
+                <a:spcPts val="0"/>
+              </a:spcAft>
+              <a:buNone/>
+            </a:pPr>
+            <a:r>
+              <a:rPr lang="en" u="sng">
+                <a:solidFill>
+                  <a:schemeClr val="hlink"/>
+                </a:solidFill>
+                <a:hlinkClick r:id="rId6"/>
+              </a:rPr>
+              <a:t>https://towardsdatascience.com/create-your-own-reinforcement-learning-environment-beb12f4151ef</a:t>
+            </a:r>
+            <a:endParaRPr/>
+          </a:p>
+          <a:p>
+            <a:pPr indent="0" lvl="0" marL="0" rtl="0" algn="l">
+              <a:spcBef>
+                <a:spcPts val="1200"/>
+              </a:spcBef>
+              <a:spcAft>
+                <a:spcPts val="1200"/>
+              </a:spcAft>
+              <a:buNone/>
+            </a:pPr>
+            <a:r>
+              <a:rPr lang="en"/>
+              <a:t>https://neptune.ai/blog/the-best-tools-for-reinforcement-learning-in-python</a:t>
+            </a:r>
+            <a:endParaRPr/>
+          </a:p>
+        </p:txBody>
+      </p:sp>
+    </p:spTree>
+  </p:cSld>
+  <p:clrMapOvr>
+    <a:masterClrMapping/>
+  </p:clrMapOvr>
+</p:sld>
+</file>
+
+<file path=ppt/slides/slide12.xml><?xml version="1.0" encoding="utf-8"?>
+<p:sld xmlns:a="http://schemas.openxmlformats.org/drawingml/2006/main" xmlns:r="http://schemas.openxmlformats.org/officeDocument/2006/relationships" xmlns:mc="http://schemas.openxmlformats.org/markup-compatibility/2006" xmlns:mv="urn:schemas-microsoft-com:mac:vml" xmlns:p="http://schemas.openxmlformats.org/presentationml/2006/main" xmlns:c="http://schemas.openxmlformats.org/drawingml/2006/chart" xmlns:dgm="http://schemas.openxmlformats.org/drawingml/2006/diagram" xmlns:o="urn:schemas-microsoft-com:office:office" xmlns:v="urn:schemas-microsoft-com:vml" xmlns:pvml="urn:schemas-microsoft-com:office:powerpoint" xmlns:com="http://schemas.openxmlformats.org/drawingml/2006/compatibility" xmlns:p14="http://schemas.microsoft.com/office/powerpoint/2010/main" xmlns:p15="http://schemas.microsoft.com/office/powerpoint/2012/main" xmlns:ahyp="http://schemas.microsoft.com/office/drawing/2018/hyperlinkcolor">
+  <p:cSld>
+    <p:spTree>
+      <p:nvGrpSpPr>
+        <p:cNvPr id="147" name="Shape 147"/>
+        <p:cNvGrpSpPr/>
+        <p:nvPr/>
+      </p:nvGrpSpPr>
+      <p:grpSpPr>
+        <a:xfrm>
+          <a:off x="0" y="0"/>
+          <a:ext cx="0" cy="0"/>
+          <a:chOff x="0" y="0"/>
+          <a:chExt cx="0" cy="0"/>
+        </a:xfrm>
+      </p:grpSpPr>
+      <p:sp>
+        <p:nvSpPr>
+          <p:cNvPr id="148" name="Google Shape;148;p8"/>
           <p:cNvSpPr txBox="1"/>
           <p:nvPr>
             <p:ph type="title"/>
@@ -8195,7 +8523,7 @@
       </p:sp>
       <p:sp>
         <p:nvSpPr>
-          <p:cNvPr id="141" name="Google Shape;141;p8"/>
+          <p:cNvPr id="149" name="Google Shape;149;p8"/>
           <p:cNvSpPr txBox="1"/>
           <p:nvPr>
             <p:ph idx="1" type="body"/>
@@ -8275,7 +8603,7 @@
             </a:pPr>
             <a:r>
               <a:rPr lang="en"/>
-              <a:t>Cloud setup on AWS and Azure</a:t>
+              <a:t>Cloud setup on Google CoLab</a:t>
             </a:r>
             <a:endParaRPr/>
           </a:p>
@@ -8294,13 +8622,8 @@
               <a:buChar char="●"/>
             </a:pPr>
             <a:r>
-              <a:rPr lang="en" u="sng">
-                <a:solidFill>
-                  <a:schemeClr val="hlink"/>
-                </a:solidFill>
-                <a:hlinkClick r:id="rId3"/>
-              </a:rPr>
-              <a:t>Tic Tac Toe</a:t>
+              <a:rPr lang="en"/>
+              <a:t>Q-Learning (Drop Game)</a:t>
             </a:r>
             <a:endParaRPr/>
           </a:p>
@@ -8319,38 +8642,8 @@
               <a:buChar char="●"/>
             </a:pPr>
             <a:r>
-              <a:rPr lang="en" u="sng">
-                <a:solidFill>
-                  <a:schemeClr val="hlink"/>
-                </a:solidFill>
-                <a:hlinkClick r:id="rId4"/>
-              </a:rPr>
-              <a:t>Blackjack</a:t>
-            </a:r>
-            <a:endParaRPr/>
-          </a:p>
-          <a:p>
-            <a:pPr indent="-342900" lvl="0" marL="457200" rtl="0" algn="l">
-              <a:lnSpc>
-                <a:spcPct val="115000"/>
-              </a:lnSpc>
-              <a:spcBef>
-                <a:spcPts val="0"/>
-              </a:spcBef>
-              <a:spcAft>
-                <a:spcPts val="0"/>
-              </a:spcAft>
-              <a:buSzPts val="1800"/>
-              <a:buChar char="●"/>
-            </a:pPr>
-            <a:r>
-              <a:rPr lang="en" u="sng">
-                <a:solidFill>
-                  <a:schemeClr val="hlink"/>
-                </a:solidFill>
-                <a:hlinkClick r:id="rId5"/>
-              </a:rPr>
-              <a:t>Pole Balancing (AWS)</a:t>
+              <a:rPr lang="en"/>
+              <a:t>Deep Learning (Blackjack)</a:t>
             </a:r>
             <a:endParaRPr/>
           </a:p>
@@ -8377,12 +8670,12 @@
       </p:sp>
       <p:pic>
         <p:nvPicPr>
-          <p:cNvPr descr="Hands typing on laptop keyboard" id="142" name="Google Shape;142;p8"/>
+          <p:cNvPr descr="Hands typing on laptop keyboard" id="150" name="Google Shape;150;p8"/>
           <p:cNvPicPr preferRelativeResize="0"/>
           <p:nvPr/>
         </p:nvPicPr>
         <p:blipFill rotWithShape="1">
-          <a:blip r:embed="rId6">
+          <a:blip r:embed="rId3">
             <a:alphaModFix/>
           </a:blip>
           <a:srcRect b="0" l="0" r="0" t="0"/>
@@ -8410,12 +8703,12 @@
 </p:sld>
 </file>
 
-<file path=ppt/slides/slide12.xml><?xml version="1.0" encoding="utf-8"?>
+<file path=ppt/slides/slide13.xml><?xml version="1.0" encoding="utf-8"?>
 <p:sld xmlns:a="http://schemas.openxmlformats.org/drawingml/2006/main" xmlns:r="http://schemas.openxmlformats.org/officeDocument/2006/relationships" xmlns:mc="http://schemas.openxmlformats.org/markup-compatibility/2006" xmlns:mv="urn:schemas-microsoft-com:mac:vml" xmlns:p="http://schemas.openxmlformats.org/presentationml/2006/main" xmlns:c="http://schemas.openxmlformats.org/drawingml/2006/chart" xmlns:dgm="http://schemas.openxmlformats.org/drawingml/2006/diagram" xmlns:o="urn:schemas-microsoft-com:office:office" xmlns:v="urn:schemas-microsoft-com:vml" xmlns:pvml="urn:schemas-microsoft-com:office:powerpoint" xmlns:com="http://schemas.openxmlformats.org/drawingml/2006/compatibility" xmlns:p14="http://schemas.microsoft.com/office/powerpoint/2010/main" xmlns:p15="http://schemas.microsoft.com/office/powerpoint/2012/main" xmlns:ahyp="http://schemas.microsoft.com/office/drawing/2018/hyperlinkcolor">
   <p:cSld>
     <p:spTree>
       <p:nvGrpSpPr>
-        <p:cNvPr id="146" name="Shape 146"/>
+        <p:cNvPr id="154" name="Shape 154"/>
         <p:cNvGrpSpPr/>
         <p:nvPr/>
       </p:nvGrpSpPr>
@@ -8429,7 +8722,7 @@
       </p:grpSpPr>
       <p:sp>
         <p:nvSpPr>
-          <p:cNvPr id="147" name="Google Shape;147;p9"/>
+          <p:cNvPr id="155" name="Google Shape;155;p9"/>
           <p:cNvSpPr txBox="1"/>
           <p:nvPr>
             <p:ph type="title"/>
@@ -8477,7 +8770,7 @@
       </p:sp>
       <p:sp>
         <p:nvSpPr>
-          <p:cNvPr id="148" name="Google Shape;148;p9"/>
+          <p:cNvPr id="156" name="Google Shape;156;p9"/>
           <p:cNvSpPr txBox="1"/>
           <p:nvPr>
             <p:ph idx="1" type="body"/>
@@ -10637,9 +10930,37 @@
           <a:chExt cx="0" cy="0"/>
         </a:xfrm>
       </p:grpSpPr>
+      <p:pic>
+        <p:nvPicPr>
+          <p:cNvPr id="128" name="Google Shape;128;g2595d704a7b_1_0"/>
+          <p:cNvPicPr preferRelativeResize="0"/>
+          <p:nvPr/>
+        </p:nvPicPr>
+        <p:blipFill>
+          <a:blip r:embed="rId3">
+            <a:alphaModFix/>
+          </a:blip>
+          <a:stretch>
+            <a:fillRect/>
+          </a:stretch>
+        </p:blipFill>
+        <p:spPr>
+          <a:xfrm>
+            <a:off x="3932975" y="2353400"/>
+            <a:ext cx="5161675" cy="2790100"/>
+          </a:xfrm>
+          <a:prstGeom prst="rect">
+            <a:avLst/>
+          </a:prstGeom>
+          <a:noFill/>
+          <a:ln>
+            <a:noFill/>
+          </a:ln>
+        </p:spPr>
+      </p:pic>
       <p:sp>
         <p:nvSpPr>
-          <p:cNvPr id="128" name="Google Shape;128;g2595d704a7b_1_0"/>
+          <p:cNvPr id="129" name="Google Shape;129;g2595d704a7b_1_0"/>
           <p:cNvSpPr txBox="1"/>
           <p:nvPr>
             <p:ph type="title"/>
@@ -10687,7 +11008,7 @@
       </p:sp>
       <p:sp>
         <p:nvSpPr>
-          <p:cNvPr id="129" name="Google Shape;129;g2595d704a7b_1_0"/>
+          <p:cNvPr id="130" name="Google Shape;130;g2595d704a7b_1_0"/>
           <p:cNvSpPr txBox="1"/>
           <p:nvPr>
             <p:ph idx="1" type="body"/>
@@ -10695,8 +11016,8 @@
         </p:nvSpPr>
         <p:spPr>
           <a:xfrm>
-            <a:off x="311700" y="1152475"/>
-            <a:ext cx="8520600" cy="3416400"/>
+            <a:off x="311700" y="1017725"/>
+            <a:ext cx="8041800" cy="3416400"/>
           </a:xfrm>
           <a:prstGeom prst="rect">
             <a:avLst/>
@@ -10724,8 +11045,127 @@
             </a:r>
             <a:endParaRPr/>
           </a:p>
+          <a:p>
+            <a:pPr indent="-342900" lvl="0" marL="457200" rtl="0" algn="l">
+              <a:spcBef>
+                <a:spcPts val="0"/>
+              </a:spcBef>
+              <a:spcAft>
+                <a:spcPts val="0"/>
+              </a:spcAft>
+              <a:buSzPts val="1800"/>
+              <a:buChar char="●"/>
+            </a:pPr>
+            <a:r>
+              <a:rPr lang="en"/>
+              <a:t>DQN</a:t>
+            </a:r>
+            <a:endParaRPr/>
+          </a:p>
+          <a:p>
+            <a:pPr indent="-342900" lvl="0" marL="457200" rtl="0" algn="l">
+              <a:spcBef>
+                <a:spcPts val="0"/>
+              </a:spcBef>
+              <a:spcAft>
+                <a:spcPts val="0"/>
+              </a:spcAft>
+              <a:buSzPts val="1800"/>
+              <a:buChar char="●"/>
+            </a:pPr>
+            <a:r>
+              <a:rPr lang="en"/>
+              <a:t>Policy Network and Target Network</a:t>
+            </a:r>
+            <a:endParaRPr/>
+          </a:p>
+          <a:p>
+            <a:pPr indent="-342900" lvl="0" marL="457200" rtl="0" algn="l">
+              <a:spcBef>
+                <a:spcPts val="0"/>
+              </a:spcBef>
+              <a:spcAft>
+                <a:spcPts val="0"/>
+              </a:spcAft>
+              <a:buSzPts val="1800"/>
+              <a:buChar char="●"/>
+            </a:pPr>
+            <a:r>
+              <a:rPr lang="en"/>
+              <a:t>Replay Memory List of [[State, Action, Reward, New State],...,]</a:t>
+            </a:r>
+            <a:endParaRPr/>
+          </a:p>
+          <a:p>
+            <a:pPr indent="-317500" lvl="1" marL="914400" rtl="0" algn="l">
+              <a:spcBef>
+                <a:spcPts val="0"/>
+              </a:spcBef>
+              <a:spcAft>
+                <a:spcPts val="0"/>
+              </a:spcAft>
+              <a:buSzPts val="1400"/>
+              <a:buChar char="○"/>
+            </a:pPr>
+            <a:r>
+              <a:rPr i="1" lang="en"/>
+              <a:t>Complete </a:t>
+            </a:r>
+            <a:r>
+              <a:rPr i="1" lang="en"/>
+              <a:t>Experience</a:t>
+            </a:r>
+            <a:endParaRPr i="1"/>
+          </a:p>
+          <a:p>
+            <a:pPr indent="-342900" lvl="0" marL="457200" rtl="0" algn="l">
+              <a:spcBef>
+                <a:spcPts val="0"/>
+              </a:spcBef>
+              <a:spcAft>
+                <a:spcPts val="0"/>
+              </a:spcAft>
+              <a:buSzPts val="1800"/>
+              <a:buChar char="●"/>
+            </a:pPr>
+            <a:r>
+              <a:rPr lang="en"/>
+              <a:t>Loss between Q-Values and Target Q-Values</a:t>
+            </a:r>
+            <a:endParaRPr/>
+          </a:p>
         </p:txBody>
       </p:sp>
+      <p:pic>
+        <p:nvPicPr>
+          <p:cNvPr id="131" name="Google Shape;131;g2595d704a7b_1_0">
+            <a:hlinkClick r:id="rId4"/>
+          </p:cNvPr>
+          <p:cNvPicPr preferRelativeResize="0"/>
+          <p:nvPr/>
+        </p:nvPicPr>
+        <p:blipFill>
+          <a:blip r:embed="rId5">
+            <a:alphaModFix/>
+          </a:blip>
+          <a:stretch>
+            <a:fillRect/>
+          </a:stretch>
+        </p:blipFill>
+        <p:spPr>
+          <a:xfrm>
+            <a:off x="481300" y="3315666"/>
+            <a:ext cx="1423300" cy="1240775"/>
+          </a:xfrm>
+          <a:prstGeom prst="rect">
+            <a:avLst/>
+          </a:prstGeom>
+          <a:noFill/>
+          <a:ln>
+            <a:noFill/>
+          </a:ln>
+        </p:spPr>
+      </p:pic>
     </p:spTree>
   </p:cSld>
   <p:clrMapOvr>

</xml_diff>

<commit_message>
Updated Notebooks and Presentation
</commit_message>
<xml_diff>
--- a/Reinforcement Learning2.pptx
+++ b/Reinforcement Learning2.pptx
@@ -11281,13 +11281,12 @@
           <p:cNvPicPr preferRelativeResize="0"/>
           <p:nvPr/>
         </p:nvPicPr>
-        <p:blipFill>
+        <p:blipFill rotWithShape="1">
           <a:blip r:embed="rId3">
             <a:alphaModFix/>
           </a:blip>
-          <a:stretch>
-            <a:fillRect/>
-          </a:stretch>
+          <a:srcRect b="0" l="0" r="0" t="0"/>
+          <a:stretch/>
         </p:blipFill>
         <p:spPr>
           <a:xfrm>
@@ -11879,7 +11878,7 @@
             </a:pPr>
             <a:r>
               <a:rPr lang="en"/>
-              <a:t> Google CoLab</a:t>
+              <a:t>Google CoLab</a:t>
             </a:r>
             <a:endParaRPr/>
           </a:p>
@@ -12326,15 +12325,12 @@
             </a:pPr>
             <a:r>
               <a:rPr lang="en"/>
-              <a:t>RL Defined and Compared</a:t>
+              <a:t>RL Applied</a:t>
             </a:r>
             <a:endParaRPr/>
           </a:p>
           <a:p>
             <a:pPr indent="-342900" lvl="0" marL="457200" rtl="0" algn="l">
-              <a:lnSpc>
-                <a:spcPct val="115000"/>
-              </a:lnSpc>
               <a:spcBef>
                 <a:spcPts val="0"/>
               </a:spcBef>
@@ -12346,7 +12342,7 @@
             </a:pPr>
             <a:r>
               <a:rPr lang="en"/>
-              <a:t>RL Applied</a:t>
+              <a:t>RL Defined and Compared</a:t>
             </a:r>
             <a:endParaRPr/>
           </a:p>
@@ -12502,14 +12498,6 @@
               <a:buNone/>
             </a:pPr>
             <a:r>
-              <a:rPr lang="en"/>
-              <a:t>Presentation</a:t>
-            </a:r>
-            <a:r>
-              <a:rPr lang="en"/>
-              <a:t> and </a:t>
-            </a:r>
-            <a:r>
               <a:rPr b="0" i="0" lang="en" sz="1400" u="none" cap="none" strike="noStrike">
                 <a:solidFill>
                   <a:srgbClr val="000000"/>
@@ -12519,7 +12507,7 @@
                 <a:cs typeface="Arial"/>
                 <a:sym typeface="Arial"/>
               </a:rPr>
-              <a:t>Code available at github.com:JWHPortfolio/RLTalk.git</a:t>
+              <a:t>Presentation and Code available at github.com:JWHPortfolio/RLTalk.git</a:t>
             </a:r>
             <a:endParaRPr b="0" i="0" sz="1400" u="none" cap="none" strike="noStrike">
               <a:solidFill>
@@ -14237,7 +14225,7 @@
               <a:buClr>
                 <a:schemeClr val="dk1"/>
               </a:buClr>
-              <a:buSzPct val="61110"/>
+              <a:buSzPct val="61109"/>
               <a:buFont typeface="Arial"/>
               <a:buNone/>
             </a:pPr>
@@ -14261,7 +14249,7 @@
               <a:buClr>
                 <a:schemeClr val="dk1"/>
               </a:buClr>
-              <a:buSzPct val="61110"/>
+              <a:buSzPct val="61109"/>
               <a:buFont typeface="Arial"/>
               <a:buNone/>
             </a:pPr>

</xml_diff>

<commit_message>
updated links on presentation
</commit_message>
<xml_diff>
--- a/Reinforcement Learning2.pptx
+++ b/Reinforcement Learning2.pptx
@@ -11530,7 +11530,7 @@
             </a:pPr>
             <a:r>
               <a:rPr lang="en"/>
-              <a:t>Available Environments</a:t>
+              <a:t>Available Environments and More…</a:t>
             </a:r>
             <a:endParaRPr/>
           </a:p>
@@ -11559,7 +11559,7 @@
         </p:spPr>
         <p:txBody>
           <a:bodyPr anchorCtr="0" anchor="t" bIns="91425" lIns="91425" spcFirstLastPara="1" rIns="91425" wrap="square" tIns="91425">
-            <a:normAutofit lnSpcReduction="20000"/>
+            <a:normAutofit fontScale="77500" lnSpcReduction="20000"/>
           </a:bodyPr>
           <a:lstStyle/>
           <a:p>
@@ -11573,7 +11573,7 @@
               <a:spcAft>
                 <a:spcPts val="0"/>
               </a:spcAft>
-              <a:buSzPts val="1800"/>
+              <a:buSzPct val="100000"/>
               <a:buNone/>
             </a:pPr>
             <a:r>
@@ -11598,7 +11598,7 @@
               <a:spcAft>
                 <a:spcPts val="0"/>
               </a:spcAft>
-              <a:buSzPts val="1800"/>
+              <a:buSzPct val="100000"/>
               <a:buNone/>
             </a:pPr>
             <a:r>
@@ -11617,7 +11617,7 @@
               <a:spcAft>
                 <a:spcPts val="0"/>
               </a:spcAft>
-              <a:buSzPts val="1800"/>
+              <a:buSzPct val="100000"/>
               <a:buNone/>
             </a:pPr>
             <a:r>
@@ -11642,7 +11642,7 @@
               <a:spcAft>
                 <a:spcPts val="0"/>
               </a:spcAft>
-              <a:buSzPts val="1800"/>
+              <a:buSzPct val="100000"/>
               <a:buNone/>
             </a:pPr>
             <a:r>
@@ -11667,7 +11667,7 @@
               <a:spcAft>
                 <a:spcPts val="0"/>
               </a:spcAft>
-              <a:buSzPts val="1800"/>
+              <a:buSzPct val="100000"/>
               <a:buNone/>
             </a:pPr>
             <a:r>
@@ -11690,14 +11690,69 @@
                 <a:spcPts val="1200"/>
               </a:spcBef>
               <a:spcAft>
-                <a:spcPts val="1200"/>
-              </a:spcAft>
-              <a:buSzPts val="1800"/>
+                <a:spcPts val="0"/>
+              </a:spcAft>
+              <a:buSzPct val="100000"/>
               <a:buNone/>
             </a:pPr>
             <a:r>
-              <a:rPr lang="en"/>
+              <a:rPr lang="en" u="sng">
+                <a:solidFill>
+                  <a:schemeClr val="hlink"/>
+                </a:solidFill>
+                <a:hlinkClick r:id="rId7"/>
+              </a:rPr>
               <a:t>https://neptune.ai/blog/the-best-tools-for-reinforcement-learning-in-python</a:t>
+            </a:r>
+            <a:endParaRPr/>
+          </a:p>
+          <a:p>
+            <a:pPr indent="0" lvl="0" marL="0" rtl="0" algn="l">
+              <a:lnSpc>
+                <a:spcPct val="115000"/>
+              </a:lnSpc>
+              <a:spcBef>
+                <a:spcPts val="1200"/>
+              </a:spcBef>
+              <a:spcAft>
+                <a:spcPts val="0"/>
+              </a:spcAft>
+              <a:buSzPct val="100000"/>
+              <a:buNone/>
+            </a:pPr>
+            <a:r>
+              <a:rPr lang="en" u="sng">
+                <a:solidFill>
+                  <a:schemeClr val="hlink"/>
+                </a:solidFill>
+                <a:hlinkClick r:id="rId8"/>
+              </a:rPr>
+              <a:t>https://pytorch.org/tutorials/intermediate/reinforcement_ppo.html</a:t>
+            </a:r>
+            <a:endParaRPr/>
+          </a:p>
+          <a:p>
+            <a:pPr indent="0" lvl="0" marL="0" rtl="0" algn="l">
+              <a:lnSpc>
+                <a:spcPct val="115000"/>
+              </a:lnSpc>
+              <a:spcBef>
+                <a:spcPts val="1200"/>
+              </a:spcBef>
+              <a:spcAft>
+                <a:spcPts val="1200"/>
+              </a:spcAft>
+              <a:buSzPct val="100000"/>
+              <a:buNone/>
+            </a:pPr>
+            <a:r>
+              <a:rPr lang="en" u="sng">
+                <a:solidFill>
+                  <a:schemeClr val="hlink"/>
+                </a:solidFill>
+                <a:hlinkClick r:id="rId9"/>
+              </a:rPr>
+              <a:t>https://stable-baselines3.readthedocs.io/en/master/guide/algos.html</a:t>
             </a:r>
             <a:endParaRPr/>
           </a:p>
@@ -13234,14 +13289,15 @@
               <a:buNone/>
             </a:pPr>
             <a:r>
-              <a:rPr b="0" i="0" lang="en" sz="1400" u="none" cap="none" strike="noStrike">
+              <a:rPr b="0" i="0" lang="en" sz="1400" u="sng" cap="none" strike="noStrike">
                 <a:solidFill>
-                  <a:srgbClr val="000000"/>
+                  <a:schemeClr val="hlink"/>
                 </a:solidFill>
                 <a:latin typeface="Arial"/>
                 <a:ea typeface="Arial"/>
                 <a:cs typeface="Arial"/>
                 <a:sym typeface="Arial"/>
+                <a:hlinkClick r:id="rId4"/>
               </a:rPr>
               <a:t>https://gymnasium.farama.org/</a:t>
             </a:r>
@@ -13264,7 +13320,7 @@
           <p:nvPr/>
         </p:nvPicPr>
         <p:blipFill rotWithShape="1">
-          <a:blip r:embed="rId4">
+          <a:blip r:embed="rId5">
             <a:alphaModFix/>
           </a:blip>
           <a:srcRect b="0" l="0" r="0" t="0"/>

</xml_diff>